<commit_message>
Client udp connection working, started START command
</commit_message>
<xml_diff>
--- a/2022_2023_Project_OverviewSlide.pptx
+++ b/2022_2023_Project_OverviewSlide.pptx
@@ -5,16 +5,17 @@
     <p:sldMasterId id="2147483660" r:id="rId1"/>
   </p:sldMasterIdLst>
   <p:notesMasterIdLst>
-    <p:notesMasterId r:id="rId6"/>
+    <p:notesMasterId r:id="rId7"/>
   </p:notesMasterIdLst>
   <p:handoutMasterIdLst>
-    <p:handoutMasterId r:id="rId7"/>
+    <p:handoutMasterId r:id="rId8"/>
   </p:handoutMasterIdLst>
   <p:sldIdLst>
     <p:sldId id="300" r:id="rId2"/>
     <p:sldId id="329" r:id="rId3"/>
     <p:sldId id="331" r:id="rId4"/>
-    <p:sldId id="325" r:id="rId5"/>
+    <p:sldId id="332" r:id="rId5"/>
+    <p:sldId id="325" r:id="rId6"/>
   </p:sldIdLst>
   <p:sldSz cx="9144000" cy="6858000" type="screen4x3"/>
   <p:notesSz cx="7099300" cy="10223500"/>
@@ -358,7 +359,7 @@
           <a:p>
             <a:fld id="{06439A24-356E-4A9D-8F30-0687180299B0}" type="datetimeFigureOut">
               <a:rPr lang="en-GB" smtClean="0"/>
-              <a:t>24/11/2022</a:t>
+              <a:t>25/11/2022</a:t>
             </a:fld>
             <a:endParaRPr lang="en-GB"/>
           </a:p>
@@ -1237,7 +1238,7 @@
             <a:fld id="{BFCEC810-3514-46C5-9E00-5DF88CDB628A}" type="datetimeFigureOut">
               <a:rPr lang="en-US" smtClean="0"/>
               <a:pPr/>
-              <a:t>11/24/2022</a:t>
+              <a:t>11/25/2022</a:t>
             </a:fld>
             <a:endParaRPr lang="en-US" dirty="0"/>
           </a:p>
@@ -1413,7 +1414,7 @@
             <a:fld id="{BFCEC810-3514-46C5-9E00-5DF88CDB628A}" type="datetimeFigureOut">
               <a:rPr lang="en-US" smtClean="0"/>
               <a:pPr/>
-              <a:t>11/24/2022</a:t>
+              <a:t>11/25/2022</a:t>
             </a:fld>
             <a:endParaRPr lang="en-US" dirty="0"/>
           </a:p>
@@ -1589,7 +1590,7 @@
             <a:fld id="{BFCEC810-3514-46C5-9E00-5DF88CDB628A}" type="datetimeFigureOut">
               <a:rPr lang="en-US" smtClean="0"/>
               <a:pPr/>
-              <a:t>11/24/2022</a:t>
+              <a:t>11/25/2022</a:t>
             </a:fld>
             <a:endParaRPr lang="en-US" dirty="0"/>
           </a:p>
@@ -1830,7 +1831,7 @@
             <a:fld id="{BFCEC810-3514-46C5-9E00-5DF88CDB628A}" type="datetimeFigureOut">
               <a:rPr lang="en-US" smtClean="0"/>
               <a:pPr/>
-              <a:t>11/24/2022</a:t>
+              <a:t>11/25/2022</a:t>
             </a:fld>
             <a:endParaRPr lang="en-US" dirty="0"/>
           </a:p>
@@ -2100,7 +2101,7 @@
             <a:fld id="{BFCEC810-3514-46C5-9E00-5DF88CDB628A}" type="datetimeFigureOut">
               <a:rPr lang="en-US" smtClean="0"/>
               <a:pPr/>
-              <a:t>11/24/2022</a:t>
+              <a:t>11/25/2022</a:t>
             </a:fld>
             <a:endParaRPr lang="en-US" dirty="0"/>
           </a:p>
@@ -2321,7 +2322,7 @@
             <a:fld id="{BFCEC810-3514-46C5-9E00-5DF88CDB628A}" type="datetimeFigureOut">
               <a:rPr lang="en-US" smtClean="0"/>
               <a:pPr/>
-              <a:t>11/24/2022</a:t>
+              <a:t>11/25/2022</a:t>
             </a:fld>
             <a:endParaRPr lang="en-US" dirty="0"/>
           </a:p>
@@ -2674,7 +2675,7 @@
             <a:fld id="{BFCEC810-3514-46C5-9E00-5DF88CDB628A}" type="datetimeFigureOut">
               <a:rPr lang="en-US" smtClean="0"/>
               <a:pPr/>
-              <a:t>11/24/2022</a:t>
+              <a:t>11/25/2022</a:t>
             </a:fld>
             <a:endParaRPr lang="en-US" dirty="0"/>
           </a:p>
@@ -2907,7 +2908,7 @@
             <a:fld id="{BFCEC810-3514-46C5-9E00-5DF88CDB628A}" type="datetimeFigureOut">
               <a:rPr lang="en-US" smtClean="0"/>
               <a:pPr/>
-              <a:t>11/24/2022</a:t>
+              <a:t>11/25/2022</a:t>
             </a:fld>
             <a:endParaRPr lang="en-US" dirty="0"/>
           </a:p>
@@ -3049,7 +3050,7 @@
             <a:fld id="{BFCEC810-3514-46C5-9E00-5DF88CDB628A}" type="datetimeFigureOut">
               <a:rPr lang="en-US" smtClean="0"/>
               <a:pPr/>
-              <a:t>11/24/2022</a:t>
+              <a:t>11/25/2022</a:t>
             </a:fld>
             <a:endParaRPr lang="en-US" dirty="0"/>
           </a:p>
@@ -3327,7 +3328,7 @@
             <a:fld id="{BFCEC810-3514-46C5-9E00-5DF88CDB628A}" type="datetimeFigureOut">
               <a:rPr lang="en-US" smtClean="0"/>
               <a:pPr/>
-              <a:t>11/24/2022</a:t>
+              <a:t>11/25/2022</a:t>
             </a:fld>
             <a:endParaRPr lang="en-US" dirty="0"/>
           </a:p>
@@ -3734,7 +3735,7 @@
             <a:fld id="{BFCEC810-3514-46C5-9E00-5DF88CDB628A}" type="datetimeFigureOut">
               <a:rPr lang="en-US" smtClean="0"/>
               <a:pPr/>
-              <a:t>11/24/2022</a:t>
+              <a:t>11/25/2022</a:t>
             </a:fld>
             <a:endParaRPr lang="en-US" dirty="0"/>
           </a:p>
@@ -4072,7 +4073,7 @@
             <a:fld id="{BFCEC810-3514-46C5-9E00-5DF88CDB628A}" type="datetimeFigureOut">
               <a:rPr lang="en-US" smtClean="0"/>
               <a:pPr/>
-              <a:t>11/24/2022</a:t>
+              <a:t>11/25/2022</a:t>
             </a:fld>
             <a:endParaRPr lang="en-US" dirty="0"/>
           </a:p>
@@ -5530,7 +5531,7 @@
         <p:spPr>
           <a:xfrm>
             <a:off x="5104822" y="2162961"/>
-            <a:ext cx="1289135" cy="276999"/>
+            <a:ext cx="1204176" cy="276999"/>
           </a:xfrm>
           <a:prstGeom prst="rect">
             <a:avLst/>
@@ -5543,6 +5544,15 @@
           <a:lstStyle/>
           <a:p>
             <a:pPr lvl="0"/>
+            <a:r>
+              <a:rPr lang="en-US" sz="1200">
+                <a:solidFill>
+                  <a:prstClr val="black"/>
+                </a:solidFill>
+                <a:latin typeface="Consolas" pitchFamily="49" charset="0"/>
+              </a:rPr>
+              <a:t>GHL 101101\</a:t>
+            </a:r>
             <a:r>
               <a:rPr lang="en-US" sz="1200" dirty="0">
                 <a:solidFill>
@@ -5550,7 +5560,7 @@
                 </a:solidFill>
                 <a:latin typeface="Consolas" pitchFamily="49" charset="0"/>
               </a:rPr>
-              <a:t>GHL 1011011\n</a:t>
+              <a:t>n</a:t>
             </a:r>
           </a:p>
         </p:txBody>
@@ -6474,7 +6484,7 @@
         <p:spPr>
           <a:xfrm>
             <a:off x="5128298" y="3115100"/>
-            <a:ext cx="2988319" cy="276999"/>
+            <a:ext cx="3073277" cy="276999"/>
           </a:xfrm>
           <a:prstGeom prst="rect">
             <a:avLst/>
@@ -6494,7 +6504,7 @@
                 </a:solidFill>
                 <a:latin typeface="Consolas" pitchFamily="49" charset="0"/>
               </a:rPr>
-              <a:t>RSB OK scores.txt 10 101101 3 8\n</a:t>
+              <a:t>RSB OK scores.txt 11 101101 3 10\n</a:t>
             </a:r>
           </a:p>
         </p:txBody>
@@ -6514,7 +6524,7 @@
         <p:spPr>
           <a:xfrm>
             <a:off x="2436380" y="6135687"/>
-            <a:ext cx="4517583" cy="461665"/>
+            <a:ext cx="4602542" cy="461665"/>
           </a:xfrm>
           <a:prstGeom prst="rect">
             <a:avLst/>
@@ -6543,7 +6553,7 @@
                 </a:solidFill>
                 <a:latin typeface="Consolas" pitchFamily="49" charset="0"/>
               </a:rPr>
-              <a:t>1 – player 101101 with 3 trials for 8 letter word</a:t>
+              <a:t>1 – player 101101 with 3 trials for 10 letter word</a:t>
             </a:r>
           </a:p>
           <a:p>
@@ -6652,7 +6662,25 @@
                 </a:solidFill>
                 <a:latin typeface="Consolas" pitchFamily="49" charset="0"/>
               </a:rPr>
-              <a:t>                                  (1 line; 10 bytes)</a:t>
+              <a:t>                                  (1 line</a:t>
+            </a:r>
+            <a:r>
+              <a:rPr lang="en-US" sz="1200">
+                <a:solidFill>
+                  <a:srgbClr val="0070C0"/>
+                </a:solidFill>
+                <a:latin typeface="Consolas" pitchFamily="49" charset="0"/>
+              </a:rPr>
+              <a:t>; 11 </a:t>
+            </a:r>
+            <a:r>
+              <a:rPr lang="en-US" sz="1200" dirty="0">
+                <a:solidFill>
+                  <a:srgbClr val="0070C0"/>
+                </a:solidFill>
+                <a:latin typeface="Consolas" pitchFamily="49" charset="0"/>
+              </a:rPr>
+              <a:t>bytes)</a:t>
             </a:r>
           </a:p>
         </p:txBody>
@@ -9718,7 +9746,7 @@
         <p:spPr>
           <a:xfrm>
             <a:off x="249654" y="908720"/>
-            <a:ext cx="8786842" cy="5592300"/>
+            <a:ext cx="8786842" cy="4074642"/>
           </a:xfrm>
           <a:prstGeom prst="rect">
             <a:avLst/>
@@ -9730,6 +9758,10 @@
           </a:bodyPr>
           <a:lstStyle/>
           <a:p>
+            <a:pPr marL="893763" indent="-893763"/>
+            <a:endParaRPr lang="pt-PT" sz="900" dirty="0"/>
+          </a:p>
+          <a:p>
             <a:pPr marL="893763" indent="-893763">
               <a:lnSpc>
                 <a:spcPct val="120000"/>
@@ -9737,39 +9769,36 @@
             </a:pPr>
             <a:r>
               <a:rPr lang="pt-PT" dirty="0"/>
-              <a:t>O código desenvolvido em C ou C++ deve funcionar nos computadores dos </a:t>
-            </a:r>
-            <a:br>
+              <a:t>As chamadas de sistema </a:t>
+            </a:r>
+            <a:r>
+              <a:rPr lang="pt-PT" b="1" i="1" dirty="0" err="1"/>
+              <a:t>read</a:t>
+            </a:r>
+            <a:r>
+              <a:rPr lang="pt-PT" b="1" i="1" dirty="0"/>
+              <a:t>()</a:t>
+            </a:r>
+            <a:r>
               <a:rPr lang="pt-PT" dirty="0"/>
-            </a:br>
-            <a:r>
-              <a:rPr lang="pt-PT" b="1" dirty="0"/>
-              <a:t>laboratórios LT4 e LT5 </a:t>
+              <a:t> e </a:t>
+            </a:r>
+            <a:r>
+              <a:rPr lang="pt-PT" b="1" i="1" dirty="0" err="1"/>
+              <a:t>write</a:t>
+            </a:r>
+            <a:r>
+              <a:rPr lang="pt-PT" b="1" i="1" dirty="0"/>
+              <a:t>()</a:t>
             </a:r>
             <a:r>
               <a:rPr lang="pt-PT" dirty="0"/>
-              <a:t>e estar convenientemente </a:t>
-            </a:r>
-            <a:r>
-              <a:rPr lang="pt-PT" b="1" dirty="0"/>
-              <a:t>estruturado </a:t>
-            </a:r>
-            <a:r>
-              <a:rPr lang="pt-PT" dirty="0"/>
-              <a:t>e </a:t>
-            </a:r>
-            <a:r>
-              <a:rPr lang="pt-PT" b="1" dirty="0"/>
-              <a:t>comentado</a:t>
-            </a:r>
-            <a:r>
-              <a:rPr lang="pt-PT" dirty="0"/>
-              <a:t>. </a:t>
+              <a:t> podem ler e escrever, respetivamente, um numero de bytes inferior ao que lhes foi solicitado – deve garantir que ainda assim a sua implementação funciona corretamente. </a:t>
             </a:r>
           </a:p>
           <a:p>
             <a:pPr marL="893763" indent="-893763"/>
-            <a:endParaRPr lang="pt-PT" sz="900" dirty="0"/>
+            <a:endParaRPr lang="pt-PT" sz="1400" dirty="0"/>
           </a:p>
           <a:p>
             <a:pPr marL="893763" indent="-893763">
@@ -9779,37 +9808,123 @@
             </a:pPr>
             <a:r>
               <a:rPr lang="pt-PT" dirty="0"/>
-              <a:t>As chamadas de sistema </a:t>
-            </a:r>
-            <a:r>
-              <a:rPr lang="pt-PT" b="1" i="1" dirty="0" err="1"/>
-              <a:t>read</a:t>
-            </a:r>
-            <a:r>
-              <a:rPr lang="pt-PT" b="1" i="1" dirty="0"/>
-              <a:t>()</a:t>
-            </a:r>
-            <a:r>
-              <a:rPr lang="pt-PT" dirty="0"/>
-              <a:t> e </a:t>
-            </a:r>
-            <a:r>
-              <a:rPr lang="pt-PT" b="1" i="1" dirty="0" err="1"/>
-              <a:t>write</a:t>
-            </a:r>
-            <a:r>
-              <a:rPr lang="pt-PT" b="1" i="1" dirty="0"/>
-              <a:t>()</a:t>
-            </a:r>
-            <a:r>
-              <a:rPr lang="pt-PT" dirty="0"/>
-              <a:t> podem ler e escrever, respetivamente, um numero de bytes inferior ao que lhes foi solicitado – deve garantir que ainda assim a sua implementação funciona corretamente. </a:t>
-            </a:r>
-          </a:p>
-          <a:p>
-            <a:pPr marL="893763" indent="-893763"/>
-            <a:endParaRPr lang="pt-PT" sz="1400" dirty="0"/>
-          </a:p>
+              <a:t>Os processos (clientes e servidores) não devem terminar abruptamente. Por exemplo: </a:t>
+            </a:r>
+          </a:p>
+          <a:p>
+            <a:pPr marL="893763" indent="-893763">
+              <a:lnSpc>
+                <a:spcPct val="120000"/>
+              </a:lnSpc>
+              <a:buFont typeface="Arial" panose="020B0604020202020204" pitchFamily="34" charset="0"/>
+              <a:buChar char="•"/>
+            </a:pPr>
+            <a:r>
+              <a:rPr lang="pt-BR" dirty="0"/>
+              <a:t>Se servidor receber mensagens mal formatadas: responde com mensagem de erro apropriada, como definido no protocolo.</a:t>
+            </a:r>
+          </a:p>
+          <a:p>
+            <a:pPr marL="893763" indent="-893763">
+              <a:lnSpc>
+                <a:spcPct val="120000"/>
+              </a:lnSpc>
+              <a:buFont typeface="Arial" panose="020B0604020202020204" pitchFamily="34" charset="0"/>
+              <a:buChar char="•"/>
+            </a:pPr>
+            <a:r>
+              <a:rPr lang="pt-BR" dirty="0"/>
+              <a:t>Se cliente receber mensagens mal formatadas: temina interação com o servidor e informa o utilizador imprimindo uma mensagem de erro no écran.</a:t>
+            </a:r>
+          </a:p>
+          <a:p>
+            <a:pPr marL="893763" indent="-893763">
+              <a:lnSpc>
+                <a:spcPct val="120000"/>
+              </a:lnSpc>
+              <a:buFont typeface="Arial" panose="020B0604020202020204" pitchFamily="34" charset="0"/>
+              <a:buChar char="•"/>
+            </a:pPr>
+            <a:r>
+              <a:rPr lang="pt-BR" dirty="0"/>
+              <a:t>Erros de chamadas de sistema: as aplicações não devem terminar catastroficamente, evitando observar-se mensagens de erro do sistema operativo tais como "segmentation fault" ou "core dump"."</a:t>
+            </a:r>
+            <a:endParaRPr lang="pt-PT" dirty="0"/>
+          </a:p>
+        </p:txBody>
+      </p:sp>
+    </p:spTree>
+    <p:extLst>
+      <p:ext uri="{BB962C8B-B14F-4D97-AF65-F5344CB8AC3E}">
+        <p14:creationId xmlns:p14="http://schemas.microsoft.com/office/powerpoint/2010/main" val="2202969452"/>
+      </p:ext>
+    </p:extLst>
+  </p:cSld>
+  <p:clrMapOvr>
+    <a:masterClrMapping/>
+  </p:clrMapOvr>
+</p:sld>
+</file>
+
+<file path=ppt/slides/slide5.xml><?xml version="1.0" encoding="utf-8"?>
+<p:sld xmlns:a="http://schemas.openxmlformats.org/drawingml/2006/main" xmlns:r="http://schemas.openxmlformats.org/officeDocument/2006/relationships" xmlns:p="http://schemas.openxmlformats.org/presentationml/2006/main">
+  <p:cSld>
+    <p:spTree>
+      <p:nvGrpSpPr>
+        <p:cNvPr id="1" name=""/>
+        <p:cNvGrpSpPr/>
+        <p:nvPr/>
+      </p:nvGrpSpPr>
+      <p:grpSpPr>
+        <a:xfrm>
+          <a:off x="0" y="0"/>
+          <a:ext cx="0" cy="0"/>
+          <a:chOff x="0" y="0"/>
+          <a:chExt cx="0" cy="0"/>
+        </a:xfrm>
+      </p:grpSpPr>
+      <p:sp>
+        <p:nvSpPr>
+          <p:cNvPr id="4" name="Title 1"/>
+          <p:cNvSpPr>
+            <a:spLocks noGrp="1"/>
+          </p:cNvSpPr>
+          <p:nvPr>
+            <p:ph type="title"/>
+          </p:nvPr>
+        </p:nvSpPr>
+        <p:spPr/>
+        <p:txBody>
+          <a:bodyPr/>
+          <a:lstStyle/>
+          <a:p>
+            <a:r>
+              <a:rPr lang="en-US" dirty="0"/>
+              <a:t>RC Word Game</a:t>
+            </a:r>
+          </a:p>
+        </p:txBody>
+      </p:sp>
+      <p:sp>
+        <p:nvSpPr>
+          <p:cNvPr id="8" name="Rectangle 7"/>
+          <p:cNvSpPr/>
+          <p:nvPr/>
+        </p:nvSpPr>
+        <p:spPr>
+          <a:xfrm>
+            <a:off x="249654" y="908720"/>
+            <a:ext cx="8786842" cy="2911566"/>
+          </a:xfrm>
+          <a:prstGeom prst="rect">
+            <a:avLst/>
+          </a:prstGeom>
+        </p:spPr>
+        <p:txBody>
+          <a:bodyPr wrap="square">
+            <a:spAutoFit/>
+          </a:bodyPr>
+          <a:lstStyle/>
           <a:p>
             <a:pPr marL="893763" indent="-893763">
               <a:lnSpc>
@@ -9818,41 +9933,34 @@
             </a:pPr>
             <a:r>
               <a:rPr lang="pt-PT" dirty="0"/>
-              <a:t>Os processos (clientes e servidores) devem terminar graciosamente pelo menos nas seguintes situações de falha:</a:t>
-            </a:r>
-          </a:p>
-          <a:p>
-            <a:pPr marL="893763" indent="-893763">
-              <a:lnSpc>
-                <a:spcPct val="120000"/>
-              </a:lnSpc>
-            </a:pPr>
-            <a:r>
+              <a:t>O código desenvolvido em C ou C++ deve funcionar nos computadores dos </a:t>
+            </a:r>
+            <a:br>
               <a:rPr lang="pt-PT" dirty="0"/>
-              <a:t>•	</a:t>
-            </a:r>
+            </a:br>
             <a:r>
               <a:rPr lang="pt-PT" b="1" dirty="0"/>
-              <a:t>mensagens do protocolo erradas </a:t>
+              <a:t>laboratórios LT4 e LT5 </a:t>
             </a:r>
             <a:r>
               <a:rPr lang="pt-PT" dirty="0"/>
-              <a:t>vindas da entidade par correspondente;</a:t>
-            </a:r>
-          </a:p>
-          <a:p>
-            <a:pPr marL="893763" indent="-893763">
-              <a:lnSpc>
-                <a:spcPct val="120000"/>
-              </a:lnSpc>
-            </a:pPr>
+              <a:t>e estar convenientemente </a:t>
+            </a:r>
+            <a:r>
+              <a:rPr lang="pt-PT" b="1" dirty="0"/>
+              <a:t>estruturado </a:t>
+            </a:r>
             <a:r>
               <a:rPr lang="pt-PT" dirty="0"/>
-              <a:t>•	condições de </a:t>
+              <a:t>e </a:t>
             </a:r>
             <a:r>
               <a:rPr lang="pt-PT" b="1" dirty="0"/>
-              <a:t>erro das chamadas de sistema</a:t>
+              <a:t>comentado</a:t>
+            </a:r>
+            <a:r>
+              <a:rPr lang="pt-PT" dirty="0"/>
+              <a:t>. </a:t>
             </a:r>
           </a:p>
           <a:p>

</xml_diff>